<commit_message>
Remove lv_drivers of lvglsim
</commit_message>
<xml_diff>
--- a/setup.pptx
+++ b/setup.pptx
@@ -373,7 +373,7 @@
           <a:p>
             <a:fld id="{9FF0BE47-2AD4-4060-BC4E-4D430C7DA142}" type="datetimeFigureOut">
               <a:rPr lang="en-US" smtClean="0"/>
-              <a:t>3/29/2020</a:t>
+              <a:t>4/16/2020</a:t>
             </a:fld>
             <a:endParaRPr lang="en-US"/>
           </a:p>
@@ -586,7 +586,7 @@
           <a:p>
             <a:fld id="{9FF0BE47-2AD4-4060-BC4E-4D430C7DA142}" type="datetimeFigureOut">
               <a:rPr lang="en-US" smtClean="0"/>
-              <a:t>3/29/2020</a:t>
+              <a:t>4/16/2020</a:t>
             </a:fld>
             <a:endParaRPr lang="en-US"/>
           </a:p>
@@ -842,7 +842,7 @@
           <a:p>
             <a:fld id="{9FF0BE47-2AD4-4060-BC4E-4D430C7DA142}" type="datetimeFigureOut">
               <a:rPr lang="en-US" smtClean="0"/>
-              <a:t>3/29/2020</a:t>
+              <a:t>4/16/2020</a:t>
             </a:fld>
             <a:endParaRPr lang="en-US"/>
           </a:p>
@@ -1016,7 +1016,7 @@
           <a:p>
             <a:fld id="{9FF0BE47-2AD4-4060-BC4E-4D430C7DA142}" type="datetimeFigureOut">
               <a:rPr lang="en-US" smtClean="0"/>
-              <a:t>3/29/2020</a:t>
+              <a:t>4/16/2020</a:t>
             </a:fld>
             <a:endParaRPr lang="en-US"/>
           </a:p>
@@ -1359,7 +1359,7 @@
           <a:p>
             <a:fld id="{9FF0BE47-2AD4-4060-BC4E-4D430C7DA142}" type="datetimeFigureOut">
               <a:rPr lang="en-US" smtClean="0"/>
-              <a:t>3/29/2020</a:t>
+              <a:t>4/16/2020</a:t>
             </a:fld>
             <a:endParaRPr lang="en-US"/>
           </a:p>
@@ -1634,7 +1634,7 @@
           <a:p>
             <a:fld id="{9FF0BE47-2AD4-4060-BC4E-4D430C7DA142}" type="datetimeFigureOut">
               <a:rPr lang="en-US" smtClean="0"/>
-              <a:t>3/29/2020</a:t>
+              <a:t>4/16/2020</a:t>
             </a:fld>
             <a:endParaRPr lang="en-US"/>
           </a:p>
@@ -2013,7 +2013,7 @@
           <a:p>
             <a:fld id="{9FF0BE47-2AD4-4060-BC4E-4D430C7DA142}" type="datetimeFigureOut">
               <a:rPr lang="en-US" smtClean="0"/>
-              <a:t>3/29/2020</a:t>
+              <a:t>4/16/2020</a:t>
             </a:fld>
             <a:endParaRPr lang="en-US"/>
           </a:p>
@@ -2131,7 +2131,7 @@
           <a:p>
             <a:fld id="{9FF0BE47-2AD4-4060-BC4E-4D430C7DA142}" type="datetimeFigureOut">
               <a:rPr lang="en-US" smtClean="0"/>
-              <a:t>3/29/2020</a:t>
+              <a:t>4/16/2020</a:t>
             </a:fld>
             <a:endParaRPr lang="en-US"/>
           </a:p>
@@ -2302,7 +2302,7 @@
           <a:p>
             <a:fld id="{9FF0BE47-2AD4-4060-BC4E-4D430C7DA142}" type="datetimeFigureOut">
               <a:rPr lang="en-US" smtClean="0"/>
-              <a:t>3/29/2020</a:t>
+              <a:t>4/16/2020</a:t>
             </a:fld>
             <a:endParaRPr lang="en-US"/>
           </a:p>
@@ -2661,7 +2661,7 @@
           <a:p>
             <a:fld id="{9FF0BE47-2AD4-4060-BC4E-4D430C7DA142}" type="datetimeFigureOut">
               <a:rPr lang="en-US" smtClean="0"/>
-              <a:t>3/29/2020</a:t>
+              <a:t>4/16/2020</a:t>
             </a:fld>
             <a:endParaRPr lang="en-US"/>
           </a:p>
@@ -3043,7 +3043,7 @@
           <a:p>
             <a:fld id="{9FF0BE47-2AD4-4060-BC4E-4D430C7DA142}" type="datetimeFigureOut">
               <a:rPr lang="en-US" smtClean="0"/>
-              <a:t>3/29/2020</a:t>
+              <a:t>4/16/2020</a:t>
             </a:fld>
             <a:endParaRPr lang="en-US"/>
           </a:p>
@@ -3330,7 +3330,7 @@
           <a:p>
             <a:fld id="{9FF0BE47-2AD4-4060-BC4E-4D430C7DA142}" type="datetimeFigureOut">
               <a:rPr lang="en-US" smtClean="0"/>
-              <a:t>3/29/2020</a:t>
+              <a:t>4/16/2020</a:t>
             </a:fld>
             <a:endParaRPr lang="en-US"/>
           </a:p>
@@ -5185,7 +5185,7 @@
       </p:pic>
       <p:pic>
         <p:nvPicPr>
-          <p:cNvPr id="5" name="Picture 4"/>
+          <p:cNvPr id="7" name="Picture 6"/>
           <p:cNvPicPr>
             <a:picLocks noChangeAspect="1"/>
           </p:cNvPicPr>
@@ -5199,8 +5199,8 @@
         </p:blipFill>
         <p:spPr>
           <a:xfrm>
-            <a:off x="5867399" y="2102373"/>
-            <a:ext cx="5354955" cy="2976562"/>
+            <a:off x="1097280" y="4361980"/>
+            <a:ext cx="4391024" cy="1753070"/>
           </a:xfrm>
           <a:prstGeom prst="rect">
             <a:avLst/>
@@ -5214,7 +5214,7 @@
       </p:pic>
       <p:pic>
         <p:nvPicPr>
-          <p:cNvPr id="7" name="Picture 6"/>
+          <p:cNvPr id="3" name="Picture 2"/>
           <p:cNvPicPr>
             <a:picLocks noChangeAspect="1"/>
           </p:cNvPicPr>
@@ -5228,8 +5228,8 @@
         </p:blipFill>
         <p:spPr>
           <a:xfrm>
-            <a:off x="1097280" y="4361980"/>
-            <a:ext cx="4391024" cy="1753070"/>
+            <a:off x="5966251" y="2102373"/>
+            <a:ext cx="5276850" cy="2095500"/>
           </a:xfrm>
           <a:prstGeom prst="rect">
             <a:avLst/>
@@ -11613,11 +11613,7 @@
             </a:r>
             <a:r>
               <a:rPr lang="en-US" sz="1600" dirty="0" smtClean="0"/>
-              <a:t> and </a:t>
-            </a:r>
-            <a:r>
-              <a:rPr lang="en-US" sz="1600" dirty="0" smtClean="0"/>
-              <a:t>extract at </a:t>
+              <a:t> and extract at </a:t>
             </a:r>
             <a:r>
               <a:rPr lang="en-US" sz="1600" dirty="0" err="1" smtClean="0"/>

</xml_diff>